<commit_message>
adding ppt and recheck fw, should be ok
</commit_message>
<xml_diff>
--- a/FirmwareTransfer_Report.pptx
+++ b/FirmwareTransfer_Report.pptx
@@ -5,10 +5,10 @@
     <p:sldMasterId id="2147483648" r:id="rId1"/>
   </p:sldMasterIdLst>
   <p:notesMasterIdLst>
-    <p:notesMasterId r:id="rId10"/>
+    <p:notesMasterId r:id="rId12"/>
   </p:notesMasterIdLst>
   <p:handoutMasterIdLst>
-    <p:handoutMasterId r:id="rId11"/>
+    <p:handoutMasterId r:id="rId13"/>
   </p:handoutMasterIdLst>
   <p:sldIdLst>
     <p:sldId id="256" r:id="rId2"/>
@@ -19,6 +19,8 @@
     <p:sldId id="377" r:id="rId7"/>
     <p:sldId id="378" r:id="rId8"/>
     <p:sldId id="380" r:id="rId9"/>
+    <p:sldId id="382" r:id="rId10"/>
+    <p:sldId id="383" r:id="rId11"/>
   </p:sldIdLst>
   <p:sldSz cx="12192000" cy="6858000"/>
   <p:notesSz cx="6858000" cy="9144000"/>
@@ -130,6 +132,8 @@
             <p14:sldId id="377"/>
             <p14:sldId id="378"/>
             <p14:sldId id="380"/>
+            <p14:sldId id="382"/>
+            <p14:sldId id="383"/>
           </p14:sldIdLst>
         </p14:section>
       </p14:sectionLst>
@@ -249,7 +253,7 @@
           <a:p>
             <a:fld id="{9A8C92BB-F181-4506-8A61-5B899AADFA0D}" type="datetimeFigureOut">
               <a:rPr lang="zh-TW" altLang="en-US" smtClean="0"/>
-              <a:t>2022/6/22</a:t>
+              <a:t>2022/6/27</a:t>
             </a:fld>
             <a:endParaRPr lang="zh-TW" altLang="en-US"/>
           </a:p>
@@ -415,7 +419,7 @@
           <a:p>
             <a:fld id="{4D019015-B8C4-42FD-AE82-32B39669EA8A}" type="datetimeFigureOut">
               <a:rPr lang="zh-TW" altLang="en-US" smtClean="0"/>
-              <a:t>2022/6/22</a:t>
+              <a:t>2022/6/27</a:t>
             </a:fld>
             <a:endParaRPr lang="zh-TW" altLang="en-US"/>
           </a:p>
@@ -1537,6 +1541,250 @@
 </p:notes>
 </file>
 
+<file path=ppt/notesSlides/notesSlide8.xml><?xml version="1.0" encoding="utf-8"?>
+<p:notes xmlns:a="http://schemas.openxmlformats.org/drawingml/2006/main" xmlns:r="http://schemas.openxmlformats.org/officeDocument/2006/relationships" xmlns:p="http://schemas.openxmlformats.org/presentationml/2006/main">
+  <p:cSld>
+    <p:spTree>
+      <p:nvGrpSpPr>
+        <p:cNvPr id="1" name=""/>
+        <p:cNvGrpSpPr/>
+        <p:nvPr/>
+      </p:nvGrpSpPr>
+      <p:grpSpPr>
+        <a:xfrm>
+          <a:off x="0" y="0"/>
+          <a:ext cx="0" cy="0"/>
+          <a:chOff x="0" y="0"/>
+          <a:chExt cx="0" cy="0"/>
+        </a:xfrm>
+      </p:grpSpPr>
+      <p:sp>
+        <p:nvSpPr>
+          <p:cNvPr id="2" name="投影片圖像版面配置區 1"/>
+          <p:cNvSpPr>
+            <a:spLocks noGrp="1" noRot="1" noChangeAspect="1"/>
+          </p:cNvSpPr>
+          <p:nvPr>
+            <p:ph type="sldImg"/>
+          </p:nvPr>
+        </p:nvSpPr>
+        <p:spPr/>
+      </p:sp>
+      <p:sp>
+        <p:nvSpPr>
+          <p:cNvPr id="3" name="備忘稿版面配置區 2"/>
+          <p:cNvSpPr>
+            <a:spLocks noGrp="1"/>
+          </p:cNvSpPr>
+          <p:nvPr>
+            <p:ph type="body" idx="1"/>
+          </p:nvPr>
+        </p:nvSpPr>
+        <p:spPr/>
+        <p:txBody>
+          <a:bodyPr/>
+          <a:lstStyle/>
+          <a:p>
+            <a:endParaRPr lang="zh-TW" altLang="en-US" dirty="0"/>
+          </a:p>
+        </p:txBody>
+      </p:sp>
+      <p:sp>
+        <p:nvSpPr>
+          <p:cNvPr id="4" name="頁首版面配置區 3"/>
+          <p:cNvSpPr>
+            <a:spLocks noGrp="1"/>
+          </p:cNvSpPr>
+          <p:nvPr>
+            <p:ph type="hdr" sz="quarter" idx="10"/>
+          </p:nvPr>
+        </p:nvSpPr>
+        <p:spPr/>
+        <p:txBody>
+          <a:bodyPr/>
+          <a:lstStyle/>
+          <a:p>
+            <a:endParaRPr lang="zh-TW" altLang="en-US"/>
+          </a:p>
+        </p:txBody>
+      </p:sp>
+      <p:sp>
+        <p:nvSpPr>
+          <p:cNvPr id="5" name="頁尾版面配置區 4"/>
+          <p:cNvSpPr>
+            <a:spLocks noGrp="1"/>
+          </p:cNvSpPr>
+          <p:nvPr>
+            <p:ph type="ftr" sz="quarter" idx="11"/>
+          </p:nvPr>
+        </p:nvSpPr>
+        <p:spPr/>
+        <p:txBody>
+          <a:bodyPr/>
+          <a:lstStyle/>
+          <a:p>
+            <a:endParaRPr lang="zh-TW" altLang="en-US"/>
+          </a:p>
+        </p:txBody>
+      </p:sp>
+      <p:sp>
+        <p:nvSpPr>
+          <p:cNvPr id="6" name="投影片編號版面配置區 5"/>
+          <p:cNvSpPr>
+            <a:spLocks noGrp="1"/>
+          </p:cNvSpPr>
+          <p:nvPr>
+            <p:ph type="sldNum" sz="quarter" idx="12"/>
+          </p:nvPr>
+        </p:nvSpPr>
+        <p:spPr/>
+        <p:txBody>
+          <a:bodyPr/>
+          <a:lstStyle/>
+          <a:p>
+            <a:fld id="{72827C81-F3E8-4040-9B38-9D1301E82DAC}" type="slidenum">
+              <a:rPr lang="zh-TW" altLang="en-US" smtClean="0"/>
+              <a:t>9</a:t>
+            </a:fld>
+            <a:endParaRPr lang="zh-TW" altLang="en-US"/>
+          </a:p>
+        </p:txBody>
+      </p:sp>
+    </p:spTree>
+    <p:extLst>
+      <p:ext uri="{BB962C8B-B14F-4D97-AF65-F5344CB8AC3E}">
+        <p14:creationId xmlns:p14="http://schemas.microsoft.com/office/powerpoint/2010/main" val="3881499688"/>
+      </p:ext>
+    </p:extLst>
+  </p:cSld>
+  <p:clrMapOvr>
+    <a:masterClrMapping/>
+  </p:clrMapOvr>
+</p:notes>
+</file>
+
+<file path=ppt/notesSlides/notesSlide9.xml><?xml version="1.0" encoding="utf-8"?>
+<p:notes xmlns:a="http://schemas.openxmlformats.org/drawingml/2006/main" xmlns:r="http://schemas.openxmlformats.org/officeDocument/2006/relationships" xmlns:p="http://schemas.openxmlformats.org/presentationml/2006/main">
+  <p:cSld>
+    <p:spTree>
+      <p:nvGrpSpPr>
+        <p:cNvPr id="1" name=""/>
+        <p:cNvGrpSpPr/>
+        <p:nvPr/>
+      </p:nvGrpSpPr>
+      <p:grpSpPr>
+        <a:xfrm>
+          <a:off x="0" y="0"/>
+          <a:ext cx="0" cy="0"/>
+          <a:chOff x="0" y="0"/>
+          <a:chExt cx="0" cy="0"/>
+        </a:xfrm>
+      </p:grpSpPr>
+      <p:sp>
+        <p:nvSpPr>
+          <p:cNvPr id="2" name="投影片圖像版面配置區 1"/>
+          <p:cNvSpPr>
+            <a:spLocks noGrp="1" noRot="1" noChangeAspect="1"/>
+          </p:cNvSpPr>
+          <p:nvPr>
+            <p:ph type="sldImg"/>
+          </p:nvPr>
+        </p:nvSpPr>
+        <p:spPr/>
+      </p:sp>
+      <p:sp>
+        <p:nvSpPr>
+          <p:cNvPr id="3" name="備忘稿版面配置區 2"/>
+          <p:cNvSpPr>
+            <a:spLocks noGrp="1"/>
+          </p:cNvSpPr>
+          <p:nvPr>
+            <p:ph type="body" idx="1"/>
+          </p:nvPr>
+        </p:nvSpPr>
+        <p:spPr/>
+        <p:txBody>
+          <a:bodyPr/>
+          <a:lstStyle/>
+          <a:p>
+            <a:endParaRPr lang="zh-TW" altLang="en-US" dirty="0"/>
+          </a:p>
+        </p:txBody>
+      </p:sp>
+      <p:sp>
+        <p:nvSpPr>
+          <p:cNvPr id="4" name="頁首版面配置區 3"/>
+          <p:cNvSpPr>
+            <a:spLocks noGrp="1"/>
+          </p:cNvSpPr>
+          <p:nvPr>
+            <p:ph type="hdr" sz="quarter" idx="10"/>
+          </p:nvPr>
+        </p:nvSpPr>
+        <p:spPr/>
+        <p:txBody>
+          <a:bodyPr/>
+          <a:lstStyle/>
+          <a:p>
+            <a:endParaRPr lang="zh-TW" altLang="en-US"/>
+          </a:p>
+        </p:txBody>
+      </p:sp>
+      <p:sp>
+        <p:nvSpPr>
+          <p:cNvPr id="5" name="頁尾版面配置區 4"/>
+          <p:cNvSpPr>
+            <a:spLocks noGrp="1"/>
+          </p:cNvSpPr>
+          <p:nvPr>
+            <p:ph type="ftr" sz="quarter" idx="11"/>
+          </p:nvPr>
+        </p:nvSpPr>
+        <p:spPr/>
+        <p:txBody>
+          <a:bodyPr/>
+          <a:lstStyle/>
+          <a:p>
+            <a:endParaRPr lang="zh-TW" altLang="en-US"/>
+          </a:p>
+        </p:txBody>
+      </p:sp>
+      <p:sp>
+        <p:nvSpPr>
+          <p:cNvPr id="6" name="投影片編號版面配置區 5"/>
+          <p:cNvSpPr>
+            <a:spLocks noGrp="1"/>
+          </p:cNvSpPr>
+          <p:nvPr>
+            <p:ph type="sldNum" sz="quarter" idx="12"/>
+          </p:nvPr>
+        </p:nvSpPr>
+        <p:spPr/>
+        <p:txBody>
+          <a:bodyPr/>
+          <a:lstStyle/>
+          <a:p>
+            <a:fld id="{72827C81-F3E8-4040-9B38-9D1301E82DAC}" type="slidenum">
+              <a:rPr lang="zh-TW" altLang="en-US" smtClean="0"/>
+              <a:t>10</a:t>
+            </a:fld>
+            <a:endParaRPr lang="zh-TW" altLang="en-US"/>
+          </a:p>
+        </p:txBody>
+      </p:sp>
+    </p:spTree>
+    <p:extLst>
+      <p:ext uri="{BB962C8B-B14F-4D97-AF65-F5344CB8AC3E}">
+        <p14:creationId xmlns:p14="http://schemas.microsoft.com/office/powerpoint/2010/main" val="1319526788"/>
+      </p:ext>
+    </p:extLst>
+  </p:cSld>
+  <p:clrMapOvr>
+    <a:masterClrMapping/>
+  </p:clrMapOvr>
+</p:notes>
+</file>
+
 <file path=ppt/slideLayouts/slideLayout1.xml><?xml version="1.0" encoding="utf-8"?>
 <p:sldLayout xmlns:a="http://schemas.openxmlformats.org/drawingml/2006/main" xmlns:r="http://schemas.openxmlformats.org/officeDocument/2006/relationships" xmlns:p="http://schemas.openxmlformats.org/presentationml/2006/main" type="title" preserve="1">
   <p:cSld name="標題投影片">
@@ -1666,7 +1914,7 @@
           <a:p>
             <a:fld id="{82305AA4-59D8-423A-BAA8-2553C29339F9}" type="datetime1">
               <a:rPr lang="zh-TW" altLang="en-US" smtClean="0"/>
-              <a:t>2022/6/22</a:t>
+              <a:t>2022/6/27</a:t>
             </a:fld>
             <a:endParaRPr lang="zh-TW" altLang="en-US"/>
           </a:p>
@@ -1834,7 +2082,7 @@
           <a:p>
             <a:fld id="{E7760100-8364-4153-936A-DAF7E2C046CC}" type="datetime1">
               <a:rPr lang="zh-TW" altLang="en-US" smtClean="0"/>
-              <a:t>2022/6/22</a:t>
+              <a:t>2022/6/27</a:t>
             </a:fld>
             <a:endParaRPr lang="zh-TW" altLang="en-US"/>
           </a:p>
@@ -2012,7 +2260,7 @@
           <a:p>
             <a:fld id="{8619E4C9-9169-4672-A05E-64E81C4D9130}" type="datetime1">
               <a:rPr lang="zh-TW" altLang="en-US" smtClean="0"/>
-              <a:t>2022/6/22</a:t>
+              <a:t>2022/6/27</a:t>
             </a:fld>
             <a:endParaRPr lang="zh-TW" altLang="en-US"/>
           </a:p>
@@ -2773,7 +3021,7 @@
           <a:p>
             <a:fld id="{6BA94DF4-98DE-40E5-B375-6803A6F2737F}" type="datetime1">
               <a:rPr lang="zh-TW" altLang="en-US" smtClean="0"/>
-              <a:t>2022/6/22</a:t>
+              <a:t>2022/6/27</a:t>
             </a:fld>
             <a:endParaRPr lang="zh-TW" altLang="en-US"/>
           </a:p>
@@ -3018,7 +3266,7 @@
           <a:p>
             <a:fld id="{0FFFEB29-91FA-4EB2-89A4-D82CF7FC129E}" type="datetime1">
               <a:rPr lang="zh-TW" altLang="en-US" smtClean="0"/>
-              <a:t>2022/6/22</a:t>
+              <a:t>2022/6/27</a:t>
             </a:fld>
             <a:endParaRPr lang="zh-TW" altLang="en-US"/>
           </a:p>
@@ -3247,7 +3495,7 @@
           <a:p>
             <a:fld id="{78C94FB9-2DB5-4A71-96A3-00F28A5DAECA}" type="datetime1">
               <a:rPr lang="zh-TW" altLang="en-US" smtClean="0"/>
-              <a:t>2022/6/22</a:t>
+              <a:t>2022/6/27</a:t>
             </a:fld>
             <a:endParaRPr lang="zh-TW" altLang="en-US"/>
           </a:p>
@@ -3611,7 +3859,7 @@
           <a:p>
             <a:fld id="{1C967245-C867-4E66-A7CA-C3C2A4CF914D}" type="datetime1">
               <a:rPr lang="zh-TW" altLang="en-US" smtClean="0"/>
-              <a:t>2022/6/22</a:t>
+              <a:t>2022/6/27</a:t>
             </a:fld>
             <a:endParaRPr lang="zh-TW" altLang="en-US"/>
           </a:p>
@@ -3728,7 +3976,7 @@
           <a:p>
             <a:fld id="{19D9E49C-CE94-4B06-9C6F-C43A1CC4C65D}" type="datetime1">
               <a:rPr lang="zh-TW" altLang="en-US" smtClean="0"/>
-              <a:t>2022/6/22</a:t>
+              <a:t>2022/6/27</a:t>
             </a:fld>
             <a:endParaRPr lang="zh-TW" altLang="en-US"/>
           </a:p>
@@ -3823,7 +4071,7 @@
           <a:p>
             <a:fld id="{9E957702-2E80-47D2-966E-676E1578242A}" type="datetime1">
               <a:rPr lang="zh-TW" altLang="en-US" smtClean="0"/>
-              <a:t>2022/6/22</a:t>
+              <a:t>2022/6/27</a:t>
             </a:fld>
             <a:endParaRPr lang="zh-TW" altLang="en-US"/>
           </a:p>
@@ -4098,7 +4346,7 @@
           <a:p>
             <a:fld id="{EB41CAA8-00E4-4847-8C2E-9A2836AE9482}" type="datetime1">
               <a:rPr lang="zh-TW" altLang="en-US" smtClean="0"/>
-              <a:t>2022/6/22</a:t>
+              <a:t>2022/6/27</a:t>
             </a:fld>
             <a:endParaRPr lang="zh-TW" altLang="en-US"/>
           </a:p>
@@ -4350,7 +4598,7 @@
           <a:p>
             <a:fld id="{81FFCC34-AA8E-4FA5-B155-8D2B943D3621}" type="datetime1">
               <a:rPr lang="zh-TW" altLang="en-US" smtClean="0"/>
-              <a:t>2022/6/22</a:t>
+              <a:t>2022/6/27</a:t>
             </a:fld>
             <a:endParaRPr lang="zh-TW" altLang="en-US"/>
           </a:p>
@@ -4561,7 +4809,7 @@
           <a:p>
             <a:fld id="{E901BA0B-4627-465D-95EA-350803BA0704}" type="datetime1">
               <a:rPr lang="zh-TW" altLang="en-US" smtClean="0"/>
-              <a:t>2022/6/22</a:t>
+              <a:t>2022/6/27</a:t>
             </a:fld>
             <a:endParaRPr lang="zh-TW" altLang="en-US"/>
           </a:p>
@@ -5045,6 +5293,329 @@
 </p:sld>
 </file>
 
+<file path=ppt/slides/slide10.xml><?xml version="1.0" encoding="utf-8"?>
+<p:sld xmlns:a="http://schemas.openxmlformats.org/drawingml/2006/main" xmlns:r="http://schemas.openxmlformats.org/officeDocument/2006/relationships" xmlns:p="http://schemas.openxmlformats.org/presentationml/2006/main">
+  <p:cSld>
+    <p:spTree>
+      <p:nvGrpSpPr>
+        <p:cNvPr id="1" name=""/>
+        <p:cNvGrpSpPr/>
+        <p:nvPr/>
+      </p:nvGrpSpPr>
+      <p:grpSpPr>
+        <a:xfrm>
+          <a:off x="0" y="0"/>
+          <a:ext cx="0" cy="0"/>
+          <a:chOff x="0" y="0"/>
+          <a:chExt cx="0" cy="0"/>
+        </a:xfrm>
+      </p:grpSpPr>
+      <p:sp>
+        <p:nvSpPr>
+          <p:cNvPr id="12" name="Title 11">
+            <a:extLst>
+              <a:ext uri="{FF2B5EF4-FFF2-40B4-BE49-F238E27FC236}">
+                <a16:creationId xmlns:a16="http://schemas.microsoft.com/office/drawing/2014/main" id="{DAD552A2-B0E5-43C0-2DC1-B78D7BBE2D03}"/>
+              </a:ext>
+            </a:extLst>
+          </p:cNvPr>
+          <p:cNvSpPr>
+            <a:spLocks noGrp="1"/>
+          </p:cNvSpPr>
+          <p:nvPr>
+            <p:ph type="title"/>
+          </p:nvPr>
+        </p:nvSpPr>
+        <p:spPr/>
+        <p:txBody>
+          <a:bodyPr/>
+          <a:lstStyle/>
+          <a:p>
+            <a:r>
+              <a:rPr lang="en-US" dirty="0"/>
+              <a:t>Test list (3/3)</a:t>
+            </a:r>
+            <a:endParaRPr lang="es-ES" dirty="0"/>
+          </a:p>
+        </p:txBody>
+      </p:sp>
+      <p:sp>
+        <p:nvSpPr>
+          <p:cNvPr id="2" name="TextBox 1">
+            <a:extLst>
+              <a:ext uri="{FF2B5EF4-FFF2-40B4-BE49-F238E27FC236}">
+                <a16:creationId xmlns:a16="http://schemas.microsoft.com/office/drawing/2014/main" id="{06D514B8-E279-6BA3-24CD-06C8D79121C5}"/>
+              </a:ext>
+            </a:extLst>
+          </p:cNvPr>
+          <p:cNvSpPr txBox="1"/>
+          <p:nvPr/>
+        </p:nvSpPr>
+        <p:spPr>
+          <a:xfrm>
+            <a:off x="365760" y="831273"/>
+            <a:ext cx="11238807" cy="4278094"/>
+          </a:xfrm>
+          <a:prstGeom prst="rect">
+            <a:avLst/>
+          </a:prstGeom>
+          <a:noFill/>
+        </p:spPr>
+        <p:txBody>
+          <a:bodyPr wrap="square" rtlCol="0">
+            <a:spAutoFit/>
+          </a:bodyPr>
+          <a:lstStyle/>
+          <a:p>
+            <a:pPr marL="342900" indent="-342900">
+              <a:buFont typeface="+mj-lt"/>
+              <a:buAutoNum type="arabicPeriod" startAt="7"/>
+            </a:pPr>
+            <a:r>
+              <a:rPr lang="en-US" sz="1600" dirty="0"/>
+              <a:t>Test ADC, test different values, if the sampled values are nearly the same, ok.</a:t>
+            </a:r>
+          </a:p>
+          <a:p>
+            <a:pPr marL="800100" lvl="1" indent="-342900">
+              <a:buFont typeface="+mj-lt"/>
+              <a:buAutoNum type="arabicPeriod"/>
+            </a:pPr>
+            <a:r>
+              <a:rPr lang="en-US" sz="1600" dirty="0"/>
+              <a:t>Set the Channel to be sampled</a:t>
+            </a:r>
+          </a:p>
+          <a:p>
+            <a:pPr marL="1257300" lvl="2" indent="-342900">
+              <a:buFont typeface="+mj-lt"/>
+              <a:buAutoNum type="arabicPeriod"/>
+            </a:pPr>
+            <a:r>
+              <a:rPr lang="en-US" sz="1600" dirty="0"/>
+              <a:t>Example channel1 0xAD3701</a:t>
+            </a:r>
+          </a:p>
+          <a:p>
+            <a:pPr marL="800100" lvl="1" indent="-342900">
+              <a:buFont typeface="+mj-lt"/>
+              <a:buAutoNum type="arabicPeriod"/>
+            </a:pPr>
+            <a:r>
+              <a:rPr lang="en-US" sz="1600" dirty="0"/>
+              <a:t>Set an analog value and use EXTI pin to trigger sample</a:t>
+            </a:r>
+          </a:p>
+          <a:p>
+            <a:pPr marL="800100" lvl="1" indent="-342900">
+              <a:buFont typeface="+mj-lt"/>
+              <a:buAutoNum type="arabicPeriod"/>
+            </a:pPr>
+            <a:r>
+              <a:rPr lang="en-US" sz="1600" dirty="0"/>
+              <a:t>Read over SPI</a:t>
+            </a:r>
+          </a:p>
+          <a:p>
+            <a:pPr marL="1257300" lvl="2" indent="-342900">
+              <a:buFont typeface="+mj-lt"/>
+              <a:buAutoNum type="arabicPeriod"/>
+            </a:pPr>
+            <a:r>
+              <a:rPr lang="en-US" sz="1600" dirty="0"/>
+              <a:t>Example read 0x0168, ADC read -&gt; 0x168 LSB</a:t>
+            </a:r>
+          </a:p>
+          <a:p>
+            <a:pPr marL="800100" lvl="1" indent="-342900">
+              <a:buFont typeface="+mj-lt"/>
+              <a:buAutoNum type="arabicPeriod"/>
+            </a:pPr>
+            <a:r>
+              <a:rPr lang="en-US" sz="1600" dirty="0"/>
+              <a:t>Change input value and go back to step 2, if finished go to step 5</a:t>
+            </a:r>
+          </a:p>
+          <a:p>
+            <a:pPr marL="800100" lvl="1" indent="-342900">
+              <a:buFont typeface="+mj-lt"/>
+              <a:buAutoNum type="arabicPeriod"/>
+            </a:pPr>
+            <a:r>
+              <a:rPr lang="en-US" sz="1600" dirty="0"/>
+              <a:t>If all channels test send following command, else go to step 1 and change channel to be sampled.</a:t>
+            </a:r>
+          </a:p>
+          <a:p>
+            <a:pPr marL="1257300" lvl="2" indent="-342900">
+              <a:buFont typeface="+mj-lt"/>
+              <a:buAutoNum type="arabicPeriod"/>
+            </a:pPr>
+            <a:r>
+              <a:rPr lang="en-US" sz="1600" dirty="0"/>
+              <a:t>0xAD30</a:t>
+            </a:r>
+          </a:p>
+          <a:p>
+            <a:pPr marL="342900" indent="-342900">
+              <a:buFont typeface="+mj-lt"/>
+              <a:buAutoNum type="arabicPeriod" startAt="7"/>
+            </a:pPr>
+            <a:r>
+              <a:rPr lang="en-US" sz="1600" dirty="0"/>
+              <a:t>Test DAC</a:t>
+            </a:r>
+          </a:p>
+          <a:p>
+            <a:pPr marL="800100" lvl="1" indent="-342900">
+              <a:buFont typeface="+mj-lt"/>
+              <a:buAutoNum type="arabicPeriod"/>
+            </a:pPr>
+            <a:r>
+              <a:rPr lang="en-US" sz="1600" dirty="0"/>
+              <a:t>Turn on the module and set first value</a:t>
+            </a:r>
+          </a:p>
+          <a:p>
+            <a:pPr marL="1257300" lvl="2" indent="-342900">
+              <a:buFont typeface="+mj-lt"/>
+              <a:buAutoNum type="arabicPeriod"/>
+            </a:pPr>
+            <a:r>
+              <a:rPr lang="en-US" sz="1600" dirty="0"/>
+              <a:t>Example DAC1 (0V): 0xDC0000</a:t>
+            </a:r>
+          </a:p>
+          <a:p>
+            <a:pPr marL="1257300" lvl="2" indent="-342900">
+              <a:buFont typeface="+mj-lt"/>
+              <a:buAutoNum type="arabicPeriod"/>
+            </a:pPr>
+            <a:r>
+              <a:rPr lang="en-US" sz="1600" dirty="0"/>
+              <a:t>Example DAC2 (0V): 0xDD0000</a:t>
+            </a:r>
+          </a:p>
+          <a:p>
+            <a:pPr marL="800100" lvl="1" indent="-342900">
+              <a:buFont typeface="+mj-lt"/>
+              <a:buAutoNum type="arabicPeriod"/>
+            </a:pPr>
+            <a:r>
+              <a:rPr lang="en-US" sz="1600" dirty="0"/>
+              <a:t>Send over SPI following values</a:t>
+            </a:r>
+          </a:p>
+          <a:p>
+            <a:pPr marL="1257300" lvl="2" indent="-342900">
+              <a:buFont typeface="+mj-lt"/>
+              <a:buAutoNum type="arabicPeriod"/>
+            </a:pPr>
+            <a:r>
+              <a:rPr lang="en-US" sz="1600" dirty="0"/>
+              <a:t>Example SPI: 0x0158, new DAC value -&gt;  0x158 LSB</a:t>
+            </a:r>
+          </a:p>
+          <a:p>
+            <a:pPr marL="800100" lvl="1" indent="-342900">
+              <a:buFont typeface="+mj-lt"/>
+              <a:buAutoNum type="arabicPeriod"/>
+            </a:pPr>
+            <a:r>
+              <a:rPr lang="en-US" sz="1600" dirty="0"/>
+              <a:t>To stop send over SPI following data:</a:t>
+            </a:r>
+          </a:p>
+          <a:p>
+            <a:pPr marL="1257300" lvl="2" indent="-342900">
+              <a:buFont typeface="+mj-lt"/>
+              <a:buAutoNum type="arabicPeriod"/>
+            </a:pPr>
+            <a:r>
+              <a:rPr lang="es-ES" sz="1600" dirty="0"/>
+              <a:t>0xC7C7</a:t>
+            </a:r>
+          </a:p>
+        </p:txBody>
+      </p:sp>
+      <p:sp>
+        <p:nvSpPr>
+          <p:cNvPr id="6" name="Dodecagon 5">
+            <a:extLst>
+              <a:ext uri="{FF2B5EF4-FFF2-40B4-BE49-F238E27FC236}">
+                <a16:creationId xmlns:a16="http://schemas.microsoft.com/office/drawing/2014/main" id="{4798F338-CBDD-043D-E162-3CFB9F866E0D}"/>
+              </a:ext>
+            </a:extLst>
+          </p:cNvPr>
+          <p:cNvSpPr/>
+          <p:nvPr/>
+        </p:nvSpPr>
+        <p:spPr>
+          <a:xfrm>
+            <a:off x="9468197" y="598517"/>
+            <a:ext cx="2269374" cy="2103121"/>
+          </a:xfrm>
+          <a:prstGeom prst="dodecagon">
+            <a:avLst/>
+          </a:prstGeom>
+        </p:spPr>
+        <p:style>
+          <a:lnRef idx="2">
+            <a:schemeClr val="accent1">
+              <a:shade val="50000"/>
+            </a:schemeClr>
+          </a:lnRef>
+          <a:fillRef idx="1">
+            <a:schemeClr val="accent1"/>
+          </a:fillRef>
+          <a:effectRef idx="0">
+            <a:schemeClr val="accent1"/>
+          </a:effectRef>
+          <a:fontRef idx="minor">
+            <a:schemeClr val="lt1"/>
+          </a:fontRef>
+        </p:style>
+        <p:txBody>
+          <a:bodyPr rtlCol="0" anchor="ctr"/>
+          <a:lstStyle/>
+          <a:p>
+            <a:pPr algn="ctr"/>
+            <a:endParaRPr lang="en-US" dirty="0"/>
+          </a:p>
+          <a:p>
+            <a:pPr algn="ctr"/>
+            <a:endParaRPr lang="en-US" sz="1800" dirty="0"/>
+          </a:p>
+          <a:p>
+            <a:pPr algn="ctr"/>
+            <a:r>
+              <a:rPr lang="en-US" sz="1800" dirty="0"/>
+              <a:t>CHECH THE SLIDE 7 IN ORDER TO KNOW ABOUT THE INVOLVED PINS OR COMMANDS</a:t>
+            </a:r>
+          </a:p>
+          <a:p>
+            <a:pPr algn="ctr"/>
+            <a:endParaRPr lang="en-US" sz="1800" dirty="0"/>
+          </a:p>
+          <a:p>
+            <a:pPr algn="ctr"/>
+            <a:endParaRPr lang="en-US" sz="1800" dirty="0"/>
+          </a:p>
+        </p:txBody>
+      </p:sp>
+    </p:spTree>
+    <p:extLst>
+      <p:ext uri="{BB962C8B-B14F-4D97-AF65-F5344CB8AC3E}">
+        <p14:creationId xmlns:p14="http://schemas.microsoft.com/office/powerpoint/2010/main" val="101905411"/>
+      </p:ext>
+    </p:extLst>
+  </p:cSld>
+  <p:clrMapOvr>
+    <a:masterClrMapping/>
+  </p:clrMapOvr>
+</p:sld>
+</file>
+
 <file path=ppt/slides/slide2.xml><?xml version="1.0" encoding="utf-8"?>
 <p:sld xmlns:a="http://schemas.openxmlformats.org/drawingml/2006/main" xmlns:r="http://schemas.openxmlformats.org/officeDocument/2006/relationships" xmlns:p="http://schemas.openxmlformats.org/presentationml/2006/main">
   <p:cSld>
@@ -17375,6 +17946,62 @@
                     <a:p>
                       <a:pPr algn="ctr" fontAlgn="b"/>
                       <a:r>
+                        <a:rPr lang="es-ES" sz="900" b="0" i="0" u="none" strike="noStrike" dirty="0">
+                          <a:solidFill>
+                            <a:srgbClr val="000000"/>
+                          </a:solidFill>
+                          <a:effectLst/>
+                          <a:latin typeface="Calibri" panose="020F0502020204030204" pitchFamily="34" charset="0"/>
+                        </a:rPr>
+                        <a:t>&lt;</a:t>
+                      </a:r>
+                      <a:r>
+                        <a:rPr lang="es-ES" sz="900" b="0" i="0" u="none" strike="noStrike" dirty="0" err="1">
+                          <a:solidFill>
+                            <a:srgbClr val="000000"/>
+                          </a:solidFill>
+                          <a:effectLst/>
+                          <a:latin typeface="Calibri" panose="020F0502020204030204" pitchFamily="34" charset="0"/>
+                        </a:rPr>
+                        <a:t>value</a:t>
+                      </a:r>
+                      <a:r>
+                        <a:rPr lang="es-ES" sz="900" b="0" i="0" u="none" strike="noStrike" dirty="0">
+                          <a:solidFill>
+                            <a:srgbClr val="000000"/>
+                          </a:solidFill>
+                          <a:effectLst/>
+                          <a:latin typeface="Calibri" panose="020F0502020204030204" pitchFamily="34" charset="0"/>
+                        </a:rPr>
+                        <a:t>&gt;</a:t>
+                      </a:r>
+                    </a:p>
+                  </a:txBody>
+                  <a:tcPr marL="4639" marR="4639" marT="4639" marB="0" anchor="b">
+                    <a:lnL>
+                      <a:noFill/>
+                    </a:lnL>
+                    <a:lnR>
+                      <a:noFill/>
+                    </a:lnR>
+                    <a:lnT>
+                      <a:noFill/>
+                    </a:lnT>
+                    <a:lnB>
+                      <a:noFill/>
+                    </a:lnB>
+                    <a:solidFill>
+                      <a:srgbClr val="FCE4D6"/>
+                    </a:solidFill>
+                  </a:tcPr>
+                </a:tc>
+                <a:tc>
+                  <a:txBody>
+                    <a:bodyPr/>
+                    <a:lstStyle/>
+                    <a:p>
+                      <a:pPr algn="ctr" fontAlgn="b"/>
+                      <a:r>
                         <a:rPr lang="es-ES" sz="900" b="0" i="0" u="none" strike="noStrike">
                           <a:solidFill>
                             <a:srgbClr val="000000"/>
@@ -17382,42 +18009,6 @@
                           <a:effectLst/>
                           <a:latin typeface="Calibri" panose="020F0502020204030204" pitchFamily="34" charset="0"/>
                         </a:rPr>
-                        <a:t>&lt;value&gt;</a:t>
-                      </a:r>
-                    </a:p>
-                  </a:txBody>
-                  <a:tcPr marL="4639" marR="4639" marT="4639" marB="0" anchor="b">
-                    <a:lnL>
-                      <a:noFill/>
-                    </a:lnL>
-                    <a:lnR>
-                      <a:noFill/>
-                    </a:lnR>
-                    <a:lnT>
-                      <a:noFill/>
-                    </a:lnT>
-                    <a:lnB>
-                      <a:noFill/>
-                    </a:lnB>
-                    <a:solidFill>
-                      <a:srgbClr val="FCE4D6"/>
-                    </a:solidFill>
-                  </a:tcPr>
-                </a:tc>
-                <a:tc>
-                  <a:txBody>
-                    <a:bodyPr/>
-                    <a:lstStyle/>
-                    <a:p>
-                      <a:pPr algn="ctr" fontAlgn="b"/>
-                      <a:r>
-                        <a:rPr lang="es-ES" sz="900" b="0" i="0" u="none" strike="noStrike">
-                          <a:solidFill>
-                            <a:srgbClr val="000000"/>
-                          </a:solidFill>
-                          <a:effectLst/>
-                          <a:latin typeface="Calibri" panose="020F0502020204030204" pitchFamily="34" charset="0"/>
-                        </a:rPr>
                         <a:t>pwm change &amp; text</a:t>
                       </a:r>
                     </a:p>
@@ -17447,7 +18038,7 @@
                     <a:p>
                       <a:pPr algn="ctr" fontAlgn="b"/>
                       <a:r>
-                        <a:rPr lang="es-ES" sz="900" b="0" i="0" u="none" strike="noStrike">
+                        <a:rPr lang="es-ES" sz="900" b="0" i="0" u="none" strike="noStrike" dirty="0">
                           <a:solidFill>
                             <a:srgbClr val="000000"/>
                           </a:solidFill>
@@ -17483,7 +18074,7 @@
                     <a:p>
                       <a:pPr algn="ctr" fontAlgn="b"/>
                       <a:r>
-                        <a:rPr lang="es-ES" sz="900" b="0" i="0" u="none" strike="noStrike">
+                        <a:rPr lang="es-ES" sz="900" b="0" i="0" u="none" strike="noStrike" dirty="0">
                           <a:solidFill>
                             <a:srgbClr val="000000"/>
                           </a:solidFill>
@@ -21993,7 +22584,7 @@
           <a:p>
             <a:r>
               <a:rPr lang="en-US" dirty="0"/>
-              <a:t>Test list</a:t>
+              <a:t>Test list (1/3)</a:t>
             </a:r>
             <a:endParaRPr lang="es-ES" dirty="0"/>
           </a:p>
@@ -22013,8 +22604,8 @@
         </p:nvSpPr>
         <p:spPr>
           <a:xfrm>
-            <a:off x="340822" y="1122218"/>
-            <a:ext cx="11238807" cy="3970318"/>
+            <a:off x="365760" y="831273"/>
+            <a:ext cx="11238807" cy="5755422"/>
           </a:xfrm>
           <a:prstGeom prst="rect">
             <a:avLst/>
@@ -22032,8 +22623,56 @@
               <a:buAutoNum type="arabicPeriod"/>
             </a:pPr>
             <a:r>
-              <a:rPr lang="en-US" dirty="0"/>
-              <a:t>UART 0: ok if version is received when device turn on.</a:t>
+              <a:rPr lang="en-US" sz="1600" dirty="0"/>
+              <a:t>UART 0</a:t>
+            </a:r>
+          </a:p>
+          <a:p>
+            <a:pPr marL="800100" lvl="1" indent="-342900">
+              <a:buFont typeface="+mj-lt"/>
+              <a:buAutoNum type="arabicPeriod"/>
+            </a:pPr>
+            <a:r>
+              <a:rPr lang="en-US" sz="1600" dirty="0"/>
+              <a:t>Tx pin: 58 – PB7</a:t>
+            </a:r>
+          </a:p>
+          <a:p>
+            <a:pPr marL="800100" lvl="1" indent="-342900">
+              <a:buFont typeface="+mj-lt"/>
+              <a:buAutoNum type="arabicPeriod"/>
+            </a:pPr>
+            <a:r>
+              <a:rPr lang="en-US" sz="1600" dirty="0"/>
+              <a:t>Rx pin: 59 – PB6</a:t>
+            </a:r>
+          </a:p>
+          <a:p>
+            <a:pPr marL="800100" lvl="1" indent="-342900">
+              <a:buFont typeface="+mj-lt"/>
+              <a:buAutoNum type="arabicPeriod"/>
+            </a:pPr>
+            <a:r>
+              <a:rPr lang="en-US" sz="1600" dirty="0"/>
+              <a:t>At startup received message should be similar to: “START OK </a:t>
+            </a:r>
+            <a:r>
+              <a:rPr lang="en-US" sz="1600" dirty="0" err="1"/>
+              <a:t>vX.Y.Z</a:t>
+            </a:r>
+            <a:r>
+              <a:rPr lang="en-US" sz="1600" dirty="0"/>
+              <a:t>”</a:t>
+            </a:r>
+          </a:p>
+          <a:p>
+            <a:pPr marL="1257300" lvl="2" indent="-342900">
+              <a:buFont typeface="+mj-lt"/>
+              <a:buAutoNum type="arabicPeriod"/>
+            </a:pPr>
+            <a:r>
+              <a:rPr lang="en-US" sz="1600" dirty="0"/>
+              <a:t>X, Y and Z are numbers, Z is optional.</a:t>
             </a:r>
           </a:p>
           <a:p>
@@ -22042,8 +22681,58 @@
               <a:buAutoNum type="arabicPeriod"/>
             </a:pPr>
             <a:r>
-              <a:rPr lang="en-US" dirty="0"/>
-              <a:t>UART 2: send command over UART0, ok if received message is expected.</a:t>
+              <a:rPr lang="en-US" sz="1600" dirty="0"/>
+              <a:t>UART 2: </a:t>
+            </a:r>
+          </a:p>
+          <a:p>
+            <a:pPr marL="800100" lvl="1" indent="-342900">
+              <a:buFont typeface="+mj-lt"/>
+              <a:buAutoNum type="arabicPeriod"/>
+            </a:pPr>
+            <a:r>
+              <a:rPr lang="en-US" sz="1600" dirty="0"/>
+              <a:t>Tx pin: 29 – PB10</a:t>
+            </a:r>
+          </a:p>
+          <a:p>
+            <a:pPr marL="800100" lvl="1" indent="-342900">
+              <a:buFont typeface="+mj-lt"/>
+              <a:buAutoNum type="arabicPeriod"/>
+            </a:pPr>
+            <a:r>
+              <a:rPr lang="en-US" sz="1600" dirty="0"/>
+              <a:t>Rx pin: 30 – PB11</a:t>
+            </a:r>
+          </a:p>
+          <a:p>
+            <a:pPr marL="800100" lvl="1" indent="-342900">
+              <a:buFont typeface="+mj-lt"/>
+              <a:buAutoNum type="arabicPeriod"/>
+            </a:pPr>
+            <a:r>
+              <a:rPr lang="en-US" sz="1600" dirty="0"/>
+              <a:t>Binary command:</a:t>
+            </a:r>
+          </a:p>
+          <a:p>
+            <a:pPr marL="1257300" lvl="2" indent="-342900">
+              <a:buFont typeface="+mj-lt"/>
+              <a:buAutoNum type="arabicPeriod"/>
+            </a:pPr>
+            <a:r>
+              <a:rPr lang="en-US" sz="1600" dirty="0"/>
+              <a:t>0xCA</a:t>
+            </a:r>
+          </a:p>
+          <a:p>
+            <a:pPr marL="800100" lvl="1" indent="-342900">
+              <a:buFont typeface="+mj-lt"/>
+              <a:buAutoNum type="arabicPeriod"/>
+            </a:pPr>
+            <a:r>
+              <a:rPr lang="en-US" sz="1600" dirty="0"/>
+              <a:t>Expected message: “HELLO MPQ32020”</a:t>
             </a:r>
           </a:p>
           <a:p>
@@ -22052,8 +22741,48 @@
               <a:buAutoNum type="arabicPeriod"/>
             </a:pPr>
             <a:r>
-              <a:rPr lang="en-US" dirty="0"/>
-              <a:t>CAN: same as UART2.</a:t>
+              <a:rPr lang="en-US" sz="1600" dirty="0"/>
+              <a:t>CAN: </a:t>
+            </a:r>
+          </a:p>
+          <a:p>
+            <a:pPr marL="800100" lvl="1" indent="-342900">
+              <a:buFont typeface="+mj-lt"/>
+              <a:buAutoNum type="arabicPeriod"/>
+            </a:pPr>
+            <a:r>
+              <a:rPr lang="en-US" sz="1600" dirty="0"/>
+              <a:t>Tx pin: 45 – PA12</a:t>
+            </a:r>
+          </a:p>
+          <a:p>
+            <a:pPr marL="800100" lvl="1" indent="-342900">
+              <a:buFont typeface="+mj-lt"/>
+              <a:buAutoNum type="arabicPeriod"/>
+            </a:pPr>
+            <a:r>
+              <a:rPr lang="en-US" sz="1600" dirty="0"/>
+              <a:t>Rx pin: 44 – PA11 </a:t>
+            </a:r>
+          </a:p>
+          <a:p>
+            <a:pPr marL="800100" lvl="1" indent="-342900">
+              <a:buFont typeface="+mj-lt"/>
+              <a:buAutoNum type="arabicPeriod"/>
+            </a:pPr>
+            <a:r>
+              <a:rPr lang="en-US" sz="1600" dirty="0"/>
+              <a:t>Binary command: 0xC5</a:t>
+            </a:r>
+          </a:p>
+          <a:p>
+            <a:pPr marL="800100" lvl="1" indent="-342900">
+              <a:buFont typeface="+mj-lt"/>
+              <a:buAutoNum type="arabicPeriod"/>
+            </a:pPr>
+            <a:r>
+              <a:rPr lang="en-US" sz="1600" dirty="0"/>
+              <a:t>Expected message: “MPS”</a:t>
             </a:r>
           </a:p>
           <a:p>
@@ -22062,8 +22791,8 @@
               <a:buAutoNum type="arabicPeriod"/>
             </a:pPr>
             <a:r>
-              <a:rPr lang="en-US" dirty="0"/>
-              <a:t>Test GPIO I/O functionality.</a:t>
+              <a:rPr lang="en-US" sz="1600" dirty="0"/>
+              <a:t>GPIO I/O functionality.</a:t>
             </a:r>
           </a:p>
           <a:p>
@@ -22072,8 +22801,18 @@
               <a:buAutoNum type="arabicPeriod"/>
             </a:pPr>
             <a:r>
-              <a:rPr lang="en-US" dirty="0"/>
+              <a:rPr lang="en-US" sz="1600" dirty="0"/>
               <a:t>Middle 1</a:t>
+            </a:r>
+          </a:p>
+          <a:p>
+            <a:pPr marL="1257300" lvl="2" indent="-342900">
+              <a:buFont typeface="+mj-lt"/>
+              <a:buAutoNum type="arabicPeriod"/>
+            </a:pPr>
+            <a:r>
+              <a:rPr lang="en-US" sz="1600" dirty="0"/>
+              <a:t>Binary command: 0x6F85</a:t>
             </a:r>
           </a:p>
           <a:p>
@@ -22082,18 +22821,18 @@
               <a:buAutoNum type="arabicPeriod"/>
             </a:pPr>
             <a:r>
-              <a:rPr lang="en-US" dirty="0"/>
+              <a:rPr lang="en-US" sz="1600" dirty="0"/>
               <a:t>Middle 2</a:t>
             </a:r>
           </a:p>
           <a:p>
-            <a:pPr marL="342900" indent="-342900">
+            <a:pPr marL="1257300" lvl="2" indent="-342900">
               <a:buFont typeface="+mj-lt"/>
               <a:buAutoNum type="arabicPeriod"/>
             </a:pPr>
             <a:r>
-              <a:rPr lang="en-US" dirty="0"/>
-              <a:t>Test PWM and SR, switch frequency, duty cycle and deadtime to verify the correct behavior.</a:t>
+              <a:rPr lang="en-US" sz="1600" dirty="0"/>
+              <a:t>Binary command: 0x6F58</a:t>
             </a:r>
           </a:p>
           <a:p>
@@ -22102,86 +22841,83 @@
               <a:buAutoNum type="arabicPeriod"/>
             </a:pPr>
             <a:r>
-              <a:rPr lang="en-US" dirty="0"/>
-              <a:t>Frequency = 10, 35, 100, 200, </a:t>
+              <a:rPr lang="en-US" sz="1600" dirty="0"/>
+              <a:t>At the end send follow command:</a:t>
             </a:r>
-            <a:r>
-              <a:rPr lang="en-US" dirty="0" err="1"/>
-              <a:t>etc</a:t>
-            </a:r>
-            <a:r>
-              <a:rPr lang="en-US" dirty="0"/>
-              <a:t> [kHz]</a:t>
-            </a:r>
-          </a:p>
-          <a:p>
-            <a:pPr marL="800100" lvl="1" indent="-342900">
+          </a:p>
+          <a:p>
+            <a:pPr marL="1257300" lvl="2" indent="-342900">
               <a:buFont typeface="+mj-lt"/>
               <a:buAutoNum type="arabicPeriod"/>
             </a:pPr>
             <a:r>
-              <a:rPr lang="en-US" dirty="0"/>
-              <a:t>DC = 10, 20 ,30, </a:t>
+              <a:rPr lang="en-US" sz="1600" dirty="0"/>
+              <a:t>0x6FA4</a:t>
             </a:r>
+          </a:p>
+        </p:txBody>
+      </p:sp>
+      <p:sp>
+        <p:nvSpPr>
+          <p:cNvPr id="4" name="Dodecagon 3">
+            <a:extLst>
+              <a:ext uri="{FF2B5EF4-FFF2-40B4-BE49-F238E27FC236}">
+                <a16:creationId xmlns:a16="http://schemas.microsoft.com/office/drawing/2014/main" id="{A4B8C97F-89A3-90D2-E812-6DF82720C83C}"/>
+              </a:ext>
+            </a:extLst>
+          </p:cNvPr>
+          <p:cNvSpPr/>
+          <p:nvPr/>
+        </p:nvSpPr>
+        <p:spPr>
+          <a:xfrm>
+            <a:off x="9468197" y="598517"/>
+            <a:ext cx="2269374" cy="2103121"/>
+          </a:xfrm>
+          <a:prstGeom prst="dodecagon">
+            <a:avLst/>
+          </a:prstGeom>
+        </p:spPr>
+        <p:style>
+          <a:lnRef idx="2">
+            <a:schemeClr val="accent1">
+              <a:shade val="50000"/>
+            </a:schemeClr>
+          </a:lnRef>
+          <a:fillRef idx="1">
+            <a:schemeClr val="accent1"/>
+          </a:fillRef>
+          <a:effectRef idx="0">
+            <a:schemeClr val="accent1"/>
+          </a:effectRef>
+          <a:fontRef idx="minor">
+            <a:schemeClr val="lt1"/>
+          </a:fontRef>
+        </p:style>
+        <p:txBody>
+          <a:bodyPr rtlCol="0" anchor="ctr"/>
+          <a:lstStyle/>
+          <a:p>
+            <a:pPr algn="ctr"/>
+            <a:endParaRPr lang="en-US" sz="1800" dirty="0"/>
+          </a:p>
+          <a:p>
+            <a:pPr algn="ctr"/>
+            <a:endParaRPr lang="en-US" sz="1800" dirty="0"/>
+          </a:p>
+          <a:p>
+            <a:pPr algn="ctr"/>
             <a:r>
-              <a:rPr lang="en-US" dirty="0" err="1"/>
-              <a:t>etc</a:t>
+              <a:rPr lang="en-US" sz="1800" dirty="0"/>
+              <a:t>CHECK SLIDE 5 IN ORDER TO KNOW MORE ABOUT THE I/O CONECTIONS OR COMMANDS</a:t>
             </a:r>
-            <a:r>
-              <a:rPr lang="en-US" dirty="0"/>
-              <a:t> [%DC]</a:t>
-            </a:r>
-          </a:p>
-          <a:p>
-            <a:pPr marL="342900" indent="-342900">
-              <a:buFont typeface="+mj-lt"/>
-              <a:buAutoNum type="arabicPeriod"/>
-            </a:pPr>
-            <a:r>
-              <a:rPr lang="en-US" dirty="0"/>
-              <a:t>Test FAN output, ok measured expected values.</a:t>
-            </a:r>
-          </a:p>
-          <a:p>
-            <a:pPr marL="800100" lvl="1" indent="-342900">
-              <a:buFont typeface="+mj-lt"/>
-              <a:buAutoNum type="arabicPeriod"/>
-            </a:pPr>
-            <a:r>
-              <a:rPr lang="en-US" dirty="0"/>
-              <a:t>66,6 [kHz]</a:t>
-            </a:r>
-          </a:p>
-          <a:p>
-            <a:pPr marL="800100" lvl="1" indent="-342900">
-              <a:buFont typeface="+mj-lt"/>
-              <a:buAutoNum type="arabicPeriod"/>
-            </a:pPr>
-            <a:r>
-              <a:rPr lang="en-US"/>
-              <a:t>50 [%DC]</a:t>
-            </a:r>
-            <a:endParaRPr lang="en-US" dirty="0"/>
-          </a:p>
-          <a:p>
-            <a:pPr marL="342900" indent="-342900">
-              <a:buFont typeface="+mj-lt"/>
-              <a:buAutoNum type="arabicPeriod"/>
-            </a:pPr>
-            <a:r>
-              <a:rPr lang="en-US" dirty="0"/>
-              <a:t>Test ADC, test different values, if the sampled values are nearly the same, ok.</a:t>
-            </a:r>
-          </a:p>
-          <a:p>
-            <a:pPr marL="342900" indent="-342900">
-              <a:buFont typeface="+mj-lt"/>
-              <a:buAutoNum type="arabicPeriod"/>
-            </a:pPr>
-            <a:r>
-              <a:rPr lang="en-US" dirty="0"/>
-              <a:t>Test DAC, test different values, if the measured value are nearly the same as the requested one, ok.</a:t>
-            </a:r>
+          </a:p>
+          <a:p>
+            <a:pPr algn="ctr"/>
+            <a:endParaRPr lang="en-US" sz="1800" dirty="0"/>
+          </a:p>
+          <a:p>
+            <a:pPr algn="ctr"/>
             <a:endParaRPr lang="es-ES" dirty="0"/>
           </a:p>
         </p:txBody>
@@ -22190,6 +22926,397 @@
     <p:extLst>
       <p:ext uri="{BB962C8B-B14F-4D97-AF65-F5344CB8AC3E}">
         <p14:creationId xmlns:p14="http://schemas.microsoft.com/office/powerpoint/2010/main" val="2216361813"/>
+      </p:ext>
+    </p:extLst>
+  </p:cSld>
+  <p:clrMapOvr>
+    <a:masterClrMapping/>
+  </p:clrMapOvr>
+</p:sld>
+</file>
+
+<file path=ppt/slides/slide9.xml><?xml version="1.0" encoding="utf-8"?>
+<p:sld xmlns:a="http://schemas.openxmlformats.org/drawingml/2006/main" xmlns:r="http://schemas.openxmlformats.org/officeDocument/2006/relationships" xmlns:p="http://schemas.openxmlformats.org/presentationml/2006/main">
+  <p:cSld>
+    <p:spTree>
+      <p:nvGrpSpPr>
+        <p:cNvPr id="1" name=""/>
+        <p:cNvGrpSpPr/>
+        <p:nvPr/>
+      </p:nvGrpSpPr>
+      <p:grpSpPr>
+        <a:xfrm>
+          <a:off x="0" y="0"/>
+          <a:ext cx="0" cy="0"/>
+          <a:chOff x="0" y="0"/>
+          <a:chExt cx="0" cy="0"/>
+        </a:xfrm>
+      </p:grpSpPr>
+      <p:sp>
+        <p:nvSpPr>
+          <p:cNvPr id="12" name="Title 11">
+            <a:extLst>
+              <a:ext uri="{FF2B5EF4-FFF2-40B4-BE49-F238E27FC236}">
+                <a16:creationId xmlns:a16="http://schemas.microsoft.com/office/drawing/2014/main" id="{DAD552A2-B0E5-43C0-2DC1-B78D7BBE2D03}"/>
+              </a:ext>
+            </a:extLst>
+          </p:cNvPr>
+          <p:cNvSpPr>
+            <a:spLocks noGrp="1"/>
+          </p:cNvSpPr>
+          <p:nvPr>
+            <p:ph type="title"/>
+          </p:nvPr>
+        </p:nvSpPr>
+        <p:spPr/>
+        <p:txBody>
+          <a:bodyPr/>
+          <a:lstStyle/>
+          <a:p>
+            <a:r>
+              <a:rPr lang="en-US" dirty="0"/>
+              <a:t>Test list (2/3)</a:t>
+            </a:r>
+            <a:endParaRPr lang="es-ES" dirty="0"/>
+          </a:p>
+        </p:txBody>
+      </p:sp>
+      <p:sp>
+        <p:nvSpPr>
+          <p:cNvPr id="2" name="TextBox 1">
+            <a:extLst>
+              <a:ext uri="{FF2B5EF4-FFF2-40B4-BE49-F238E27FC236}">
+                <a16:creationId xmlns:a16="http://schemas.microsoft.com/office/drawing/2014/main" id="{06D514B8-E279-6BA3-24CD-06C8D79121C5}"/>
+              </a:ext>
+            </a:extLst>
+          </p:cNvPr>
+          <p:cNvSpPr txBox="1"/>
+          <p:nvPr/>
+        </p:nvSpPr>
+        <p:spPr>
+          <a:xfrm>
+            <a:off x="390698" y="814648"/>
+            <a:ext cx="11238807" cy="5755422"/>
+          </a:xfrm>
+          <a:prstGeom prst="rect">
+            <a:avLst/>
+          </a:prstGeom>
+          <a:noFill/>
+        </p:spPr>
+        <p:txBody>
+          <a:bodyPr wrap="square" rtlCol="0">
+            <a:spAutoFit/>
+          </a:bodyPr>
+          <a:lstStyle/>
+          <a:p>
+            <a:pPr marL="342900" indent="-342900">
+              <a:buFont typeface="+mj-lt"/>
+              <a:buAutoNum type="arabicPeriod" startAt="5"/>
+            </a:pPr>
+            <a:r>
+              <a:rPr lang="en-US" sz="1600" dirty="0"/>
+              <a:t>Test PWM and SR, switch frequency, duty cycle and deadtime to verify the correct behavior.</a:t>
+            </a:r>
+          </a:p>
+          <a:p>
+            <a:pPr marL="800100" lvl="1" indent="-342900">
+              <a:buFont typeface="+mj-lt"/>
+              <a:buAutoNum type="arabicPeriod"/>
+            </a:pPr>
+            <a:r>
+              <a:rPr lang="en-US" sz="1600" dirty="0"/>
+              <a:t>Turn on the module</a:t>
+            </a:r>
+          </a:p>
+          <a:p>
+            <a:pPr marL="1257300" lvl="2" indent="-342900">
+              <a:buFont typeface="+mj-lt"/>
+              <a:buAutoNum type="arabicPeriod"/>
+            </a:pPr>
+            <a:r>
+              <a:rPr lang="en-US" sz="1600" dirty="0"/>
+              <a:t>PWM: 0x1005</a:t>
+            </a:r>
+          </a:p>
+          <a:p>
+            <a:pPr marL="1257300" lvl="2" indent="-342900">
+              <a:buFont typeface="+mj-lt"/>
+              <a:buAutoNum type="arabicPeriod"/>
+            </a:pPr>
+            <a:r>
+              <a:rPr lang="en-US" sz="1600" dirty="0"/>
+              <a:t>SR: 0x1105</a:t>
+            </a:r>
+          </a:p>
+          <a:p>
+            <a:pPr marL="800100" lvl="1" indent="-342900">
+              <a:buFont typeface="+mj-lt"/>
+              <a:buAutoNum type="arabicPeriod"/>
+            </a:pPr>
+            <a:r>
+              <a:rPr lang="en-US" sz="1600" dirty="0"/>
+              <a:t>Change Frequency = 10, 35, 100, 200, </a:t>
+            </a:r>
+            <a:r>
+              <a:rPr lang="en-US" sz="1600" dirty="0" err="1"/>
+              <a:t>etc</a:t>
+            </a:r>
+            <a:r>
+              <a:rPr lang="en-US" sz="1600" dirty="0"/>
+              <a:t> [kHz]</a:t>
+            </a:r>
+          </a:p>
+          <a:p>
+            <a:pPr marL="1257300" lvl="2" indent="-342900">
+              <a:buFont typeface="+mj-lt"/>
+              <a:buAutoNum type="arabicPeriod"/>
+            </a:pPr>
+            <a:r>
+              <a:rPr lang="en-US" sz="1600" dirty="0"/>
+              <a:t>PWM binary command (10kHz): 0x10FC000A</a:t>
+            </a:r>
+          </a:p>
+          <a:p>
+            <a:pPr marL="1257300" lvl="2" indent="-342900">
+              <a:buFont typeface="+mj-lt"/>
+              <a:buAutoNum type="arabicPeriod"/>
+            </a:pPr>
+            <a:r>
+              <a:rPr lang="en-US" sz="1600" dirty="0"/>
+              <a:t>SR binary command (10kHz): 0x11FC000A</a:t>
+            </a:r>
+          </a:p>
+          <a:p>
+            <a:pPr marL="800100" lvl="1" indent="-342900">
+              <a:buFont typeface="+mj-lt"/>
+              <a:buAutoNum type="arabicPeriod"/>
+            </a:pPr>
+            <a:r>
+              <a:rPr lang="en-US" sz="1600" dirty="0"/>
+              <a:t>Change DC = 10, 20 ,30, </a:t>
+            </a:r>
+            <a:r>
+              <a:rPr lang="en-US" sz="1600" dirty="0" err="1"/>
+              <a:t>etc</a:t>
+            </a:r>
+            <a:r>
+              <a:rPr lang="en-US" sz="1600" dirty="0"/>
+              <a:t> [%DC]</a:t>
+            </a:r>
+          </a:p>
+          <a:p>
+            <a:pPr marL="1257300" lvl="2" indent="-342900">
+              <a:buFont typeface="+mj-lt"/>
+              <a:buAutoNum type="arabicPeriod"/>
+            </a:pPr>
+            <a:r>
+              <a:rPr lang="en-US" sz="1600" dirty="0"/>
+              <a:t>PWM binary command(10%): 0x10DC0A</a:t>
+            </a:r>
+          </a:p>
+          <a:p>
+            <a:pPr marL="1257300" lvl="2" indent="-342900">
+              <a:buFont typeface="+mj-lt"/>
+              <a:buAutoNum type="arabicPeriod"/>
+            </a:pPr>
+            <a:r>
+              <a:rPr lang="en-US" sz="1600" dirty="0"/>
+              <a:t>SR binary command(10%): 0x11DC0A</a:t>
+            </a:r>
+          </a:p>
+          <a:p>
+            <a:pPr marL="800100" lvl="1" indent="-342900">
+              <a:buFont typeface="+mj-lt"/>
+              <a:buAutoNum type="arabicPeriod"/>
+            </a:pPr>
+            <a:r>
+              <a:rPr lang="en-US" sz="1600" dirty="0"/>
+              <a:t>Change DT </a:t>
+            </a:r>
+          </a:p>
+          <a:p>
+            <a:pPr marL="1257300" lvl="2" indent="-342900">
+              <a:buFont typeface="+mj-lt"/>
+              <a:buAutoNum type="arabicPeriod"/>
+            </a:pPr>
+            <a:r>
+              <a:rPr lang="en-US" sz="1600" dirty="0"/>
+              <a:t>PWM binary command (approx. 9ns): 0x10D101</a:t>
+            </a:r>
+          </a:p>
+          <a:p>
+            <a:pPr marL="1257300" lvl="2" indent="-342900">
+              <a:buFont typeface="+mj-lt"/>
+              <a:buAutoNum type="arabicPeriod"/>
+            </a:pPr>
+            <a:r>
+              <a:rPr lang="en-US" sz="1600" dirty="0"/>
+              <a:t>SR binary command (approx. 9ns): 0x11D101</a:t>
+            </a:r>
+          </a:p>
+          <a:p>
+            <a:pPr marL="800100" lvl="1" indent="-342900">
+              <a:buFont typeface="+mj-lt"/>
+              <a:buAutoNum type="arabicPeriod"/>
+            </a:pPr>
+            <a:r>
+              <a:rPr lang="en-US" sz="1600" dirty="0"/>
+              <a:t>When finished send follow command:</a:t>
+            </a:r>
+          </a:p>
+          <a:p>
+            <a:pPr marL="1257300" lvl="2" indent="-342900">
+              <a:buFont typeface="+mj-lt"/>
+              <a:buAutoNum type="arabicPeriod"/>
+            </a:pPr>
+            <a:r>
+              <a:rPr lang="en-US" sz="1600" dirty="0"/>
+              <a:t>PWM: 0x100A</a:t>
+            </a:r>
+          </a:p>
+          <a:p>
+            <a:pPr marL="1257300" lvl="2" indent="-342900">
+              <a:buFont typeface="+mj-lt"/>
+              <a:buAutoNum type="arabicPeriod"/>
+            </a:pPr>
+            <a:r>
+              <a:rPr lang="en-US" sz="1600" dirty="0"/>
+              <a:t>SR: 0x1105</a:t>
+            </a:r>
+          </a:p>
+          <a:p>
+            <a:pPr marL="342900" indent="-342900">
+              <a:buFont typeface="+mj-lt"/>
+              <a:buAutoNum type="arabicPeriod" startAt="5"/>
+            </a:pPr>
+            <a:r>
+              <a:rPr lang="en-US" sz="1600" dirty="0"/>
+              <a:t>Test FAN.</a:t>
+            </a:r>
+          </a:p>
+          <a:p>
+            <a:pPr marL="800100" lvl="1" indent="-342900">
+              <a:buFont typeface="+mj-lt"/>
+              <a:buAutoNum type="arabicPeriod"/>
+            </a:pPr>
+            <a:r>
+              <a:rPr lang="en-US" sz="1600" dirty="0"/>
+              <a:t>Turn on the module</a:t>
+            </a:r>
+          </a:p>
+          <a:p>
+            <a:pPr marL="1257300" lvl="2" indent="-342900">
+              <a:buFont typeface="+mj-lt"/>
+              <a:buAutoNum type="arabicPeriod"/>
+            </a:pPr>
+            <a:r>
+              <a:rPr lang="en-US" sz="1600" dirty="0"/>
+              <a:t>0xFAF0</a:t>
+            </a:r>
+          </a:p>
+          <a:p>
+            <a:pPr marL="800100" lvl="1" indent="-342900">
+              <a:buFont typeface="+mj-lt"/>
+              <a:buAutoNum type="arabicPeriod"/>
+            </a:pPr>
+            <a:r>
+              <a:rPr lang="en-US" sz="1600" dirty="0"/>
+              <a:t>Measure frequency : should be 66,6 [kHz]</a:t>
+            </a:r>
+          </a:p>
+          <a:p>
+            <a:pPr marL="800100" lvl="1" indent="-342900">
+              <a:buFont typeface="+mj-lt"/>
+              <a:buAutoNum type="arabicPeriod"/>
+            </a:pPr>
+            <a:r>
+              <a:rPr lang="en-US" sz="1600" dirty="0"/>
+              <a:t>Measure DC : should be 50 [%DC]</a:t>
+            </a:r>
+          </a:p>
+          <a:p>
+            <a:pPr marL="800100" lvl="1" indent="-342900">
+              <a:buFont typeface="+mj-lt"/>
+              <a:buAutoNum type="arabicPeriod"/>
+            </a:pPr>
+            <a:r>
+              <a:rPr lang="en-US" sz="1600" dirty="0"/>
+              <a:t>When finish send the following command:</a:t>
+            </a:r>
+          </a:p>
+          <a:p>
+            <a:pPr marL="1257300" lvl="2" indent="-342900">
+              <a:buFont typeface="+mj-lt"/>
+              <a:buAutoNum type="arabicPeriod"/>
+            </a:pPr>
+            <a:r>
+              <a:rPr lang="en-US" sz="1600" dirty="0"/>
+              <a:t>0xFA0F</a:t>
+            </a:r>
+          </a:p>
+        </p:txBody>
+      </p:sp>
+      <p:sp>
+        <p:nvSpPr>
+          <p:cNvPr id="4" name="Dodecagon 3">
+            <a:extLst>
+              <a:ext uri="{FF2B5EF4-FFF2-40B4-BE49-F238E27FC236}">
+                <a16:creationId xmlns:a16="http://schemas.microsoft.com/office/drawing/2014/main" id="{B7111932-7164-D25B-8A13-F3459E3C5F1F}"/>
+              </a:ext>
+            </a:extLst>
+          </p:cNvPr>
+          <p:cNvSpPr/>
+          <p:nvPr/>
+        </p:nvSpPr>
+        <p:spPr>
+          <a:xfrm>
+            <a:off x="9468197" y="598517"/>
+            <a:ext cx="2269374" cy="2103121"/>
+          </a:xfrm>
+          <a:prstGeom prst="dodecagon">
+            <a:avLst/>
+          </a:prstGeom>
+        </p:spPr>
+        <p:style>
+          <a:lnRef idx="2">
+            <a:schemeClr val="accent1">
+              <a:shade val="50000"/>
+            </a:schemeClr>
+          </a:lnRef>
+          <a:fillRef idx="1">
+            <a:schemeClr val="accent1"/>
+          </a:fillRef>
+          <a:effectRef idx="0">
+            <a:schemeClr val="accent1"/>
+          </a:effectRef>
+          <a:fontRef idx="minor">
+            <a:schemeClr val="lt1"/>
+          </a:fontRef>
+        </p:style>
+        <p:txBody>
+          <a:bodyPr rtlCol="0" anchor="ctr"/>
+          <a:lstStyle/>
+          <a:p>
+            <a:pPr algn="ctr"/>
+            <a:endParaRPr lang="en-US" sz="1800" dirty="0"/>
+          </a:p>
+          <a:p>
+            <a:pPr algn="ctr"/>
+            <a:r>
+              <a:rPr lang="en-US" sz="1800" dirty="0"/>
+              <a:t>CHECK SLIDE 6 IN ORDER TO KNOW ABOUT THE INVOLVED PINS OR COMMANDS</a:t>
+            </a:r>
+          </a:p>
+          <a:p>
+            <a:pPr algn="ctr"/>
+            <a:endParaRPr lang="en-US" sz="1800" dirty="0"/>
+          </a:p>
+        </p:txBody>
+      </p:sp>
+    </p:spTree>
+    <p:extLst>
+      <p:ext uri="{BB962C8B-B14F-4D97-AF65-F5344CB8AC3E}">
+        <p14:creationId xmlns:p14="http://schemas.microsoft.com/office/powerpoint/2010/main" val="791778858"/>
       </p:ext>
     </p:extLst>
   </p:cSld>

</xml_diff>

<commit_message>
adding more info to ppt
</commit_message>
<xml_diff>
--- a/FirmwareTransfer_Report.pptx
+++ b/FirmwareTransfer_Report.pptx
@@ -5423,7 +5423,7 @@
             </a:pPr>
             <a:r>
               <a:rPr lang="en-US" sz="1600" dirty="0"/>
-              <a:t>Example read 0x0168, ADC read -&gt; 0x168 LSB</a:t>
+              <a:t>Example read 0x014A, ADC read -&gt; 0x14A LSB = 330 LSB  = 265 mV</a:t>
             </a:r>
           </a:p>
           <a:p>
@@ -5513,7 +5513,7 @@
             </a:pPr>
             <a:r>
               <a:rPr lang="en-US" sz="1600" dirty="0"/>
-              <a:t>Example SPI: 0x0158, new DAC value -&gt;  0x158 LSB</a:t>
+              <a:t>Example SPI: 0x0158, new DAC value -&gt;  0x14A LSB = 330 LSB = 265 mV</a:t>
             </a:r>
           </a:p>
           <a:p>

</xml_diff>